<commit_message>
Add lesson 02 slides
</commit_message>
<xml_diff>
--- a/lessons/01/slides/lesson01.pptx
+++ b/lessons/01/slides/lesson01.pptx
@@ -13091,7 +13091,7 @@
         </p:nvSpPr>
         <p:spPr>
           <a:xfrm>
-            <a:off x="318052" y="2103051"/>
+            <a:off x="1" y="1872464"/>
             <a:ext cx="9143999" cy="2804400"/>
           </a:xfrm>
           <a:prstGeom prst="rect">
@@ -13104,7 +13104,7 @@
           </a:bodyPr>
           <a:lstStyle/>
           <a:p>
-            <a:pPr marL="0" lvl="0" indent="0" algn="l" rtl="0">
+            <a:pPr marL="0" lvl="0" indent="0" algn="ctr" rtl="0">
               <a:spcBef>
                 <a:spcPts val="0"/>
               </a:spcBef>
@@ -13114,10 +13114,17 @@
               <a:buNone/>
             </a:pPr>
             <a:r>
-              <a:rPr lang="en" sz="6600" dirty="0"/>
-              <a:t>IoT Monitoring Station</a:t>
+              <a:rPr lang="en" sz="6400" dirty="0"/>
+              <a:t>Lesson 01</a:t>
             </a:r>
-            <a:endParaRPr sz="6600" dirty="0"/>
+            <a:br>
+              <a:rPr lang="en" sz="6400" dirty="0"/>
+            </a:br>
+            <a:r>
+              <a:rPr lang="en" sz="6400" dirty="0"/>
+              <a:t>-IoT Monitoring Station-</a:t>
+            </a:r>
+            <a:endParaRPr sz="6400" dirty="0"/>
           </a:p>
         </p:txBody>
       </p:sp>
@@ -14925,6 +14932,15 @@
 </file>
 
 <file path=customXml/item1.xml><?xml version="1.0" encoding="utf-8"?>
+<?mso-contentType ?>
+<FormTemplates xmlns="http://schemas.microsoft.com/sharepoint/v3/contenttype/forms">
+  <Display>DocumentLibraryForm</Display>
+  <Edit>DocumentLibraryForm</Edit>
+  <New>DocumentLibraryForm</New>
+</FormTemplates>
+</file>
+
+<file path=customXml/item2.xml><?xml version="1.0" encoding="utf-8"?>
 <ct:contentTypeSchema xmlns:ct="http://schemas.microsoft.com/office/2006/metadata/contentType" xmlns:ma="http://schemas.microsoft.com/office/2006/metadata/properties/metaAttributes" ct:_="" ma:_="" ma:contentTypeName="Document" ma:contentTypeID="0x010100AF3FF15707724F49A972C13B33FAAA8B" ma:contentTypeVersion="37" ma:contentTypeDescription="Create a new document." ma:contentTypeScope="" ma:versionID="0d6da3a96eaa39d46166618daaa295aa">
   <xsd:schema xmlns:xsd="http://www.w3.org/2001/XMLSchema" xmlns:xs="http://www.w3.org/2001/XMLSchema" xmlns:p="http://schemas.microsoft.com/office/2006/metadata/properties" xmlns:ns2="a1200294-7566-47bd-bcc6-0c4e5d371f43" xmlns:ns3="babfc5af-ba08-4223-8118-2e61d2979772" targetNamespace="http://schemas.microsoft.com/office/2006/metadata/properties" ma:root="true" ma:fieldsID="04dea3cd8ac799b83681f5649b523f8d" ns2:_="" ns3:_="">
     <xsd:import namespace="a1200294-7566-47bd-bcc6-0c4e5d371f43"/>
@@ -15205,15 +15221,6 @@
 </ct:contentTypeSchema>
 </file>
 
-<file path=customXml/item2.xml><?xml version="1.0" encoding="utf-8"?>
-<?mso-contentType ?>
-<FormTemplates xmlns="http://schemas.microsoft.com/sharepoint/v3/contenttype/forms">
-  <Display>DocumentLibraryForm</Display>
-  <Edit>DocumentLibraryForm</Edit>
-  <New>DocumentLibraryForm</New>
-</FormTemplates>
-</file>
-
 <file path=customXml/item3.xml><?xml version="1.0" encoding="utf-8"?>
 <p:properties xmlns:p="http://schemas.microsoft.com/office/2006/metadata/properties" xmlns:xsi="http://www.w3.org/2001/XMLSchema-instance" xmlns:pc="http://schemas.microsoft.com/office/infopath/2007/PartnerControls">
   <documentManagement>
@@ -15235,6 +15242,14 @@
 </file>
 
 <file path=customXml/itemProps1.xml><?xml version="1.0" encoding="utf-8"?>
+<ds:datastoreItem xmlns:ds="http://schemas.openxmlformats.org/officeDocument/2006/customXml" ds:itemID="{3C21C174-D453-4914-8411-DE970D7B2773}">
+  <ds:schemaRefs>
+    <ds:schemaRef ds:uri="http://schemas.microsoft.com/sharepoint/v3/contenttype/forms"/>
+  </ds:schemaRefs>
+</ds:datastoreItem>
+</file>
+
+<file path=customXml/itemProps2.xml><?xml version="1.0" encoding="utf-8"?>
 <ds:datastoreItem xmlns:ds="http://schemas.openxmlformats.org/officeDocument/2006/customXml" ds:itemID="{15B5AC1E-3F8B-4736-B201-2EF42848A6EC}">
   <ds:schemaRefs>
     <ds:schemaRef ds:uri="http://schemas.microsoft.com/office/2006/metadata/contentType"/>
@@ -15253,14 +15268,6 @@
 </ds:datastoreItem>
 </file>
 
-<file path=customXml/itemProps2.xml><?xml version="1.0" encoding="utf-8"?>
-<ds:datastoreItem xmlns:ds="http://schemas.openxmlformats.org/officeDocument/2006/customXml" ds:itemID="{3C21C174-D453-4914-8411-DE970D7B2773}">
-  <ds:schemaRefs>
-    <ds:schemaRef ds:uri="http://schemas.microsoft.com/sharepoint/v3/contenttype/forms"/>
-  </ds:schemaRefs>
-</ds:datastoreItem>
-</file>
-
 <file path=customXml/itemProps3.xml><?xml version="1.0" encoding="utf-8"?>
 <ds:datastoreItem xmlns:ds="http://schemas.openxmlformats.org/officeDocument/2006/customXml" ds:itemID="{06C38A34-1C09-44AF-A4CC-A67B6F751BAC}">
   <ds:schemaRefs>

</xml_diff>